<commit_message>
Large text rewriting for templates chapter. New examples.
git-svn-id: https://svn.code.sf.net/p/cpp-lects-rus/code/trunk@238 39143b06-f351-456c-9f92-4cd32fad6823
</commit_message>
<xml_diff>
--- a/slides/sep2017/08-sfinae.pptx
+++ b/slides/sep2017/08-sfinae.pptx
@@ -262,7 +262,7 @@
           <a:p>
             <a:fld id="{AF596E5B-2249-4D91-8401-1A5A37BD0FEB}" type="datetimeFigureOut">
               <a:rPr lang="en-US" smtClean="0"/>
-              <a:t>11/4/2017</a:t>
+              <a:t>11/16/2017</a:t>
             </a:fld>
             <a:endParaRPr lang="en-US"/>
           </a:p>
@@ -810,7 +810,7 @@
           <a:p>
             <a:fld id="{F85B9285-CE1C-4B1E-BFE2-81758195FA97}" type="datetime1">
               <a:rPr lang="en-US" smtClean="0"/>
-              <a:t>11/4/2017</a:t>
+              <a:t>11/16/2017</a:t>
             </a:fld>
             <a:endParaRPr lang="en-US" dirty="0"/>
           </a:p>
@@ -1027,7 +1027,7 @@
           <a:p>
             <a:fld id="{4393A97F-BF7E-4D75-9B27-457B6CB4D227}" type="datetime1">
               <a:rPr lang="en-US" smtClean="0"/>
-              <a:t>11/4/2017</a:t>
+              <a:t>11/16/2017</a:t>
             </a:fld>
             <a:endParaRPr lang="en-US" dirty="0"/>
           </a:p>
@@ -1202,7 +1202,7 @@
           <a:p>
             <a:fld id="{DC009C82-90D7-4E8D-B1CA-4B418A2315DC}" type="datetime1">
               <a:rPr lang="en-US" smtClean="0"/>
-              <a:t>11/4/2017</a:t>
+              <a:t>11/16/2017</a:t>
             </a:fld>
             <a:endParaRPr lang="en-US" dirty="0"/>
           </a:p>
@@ -1367,7 +1367,7 @@
           <a:p>
             <a:fld id="{0C62AD98-DA30-4322-9624-4D7AC7544E97}" type="datetime1">
               <a:rPr lang="en-US" smtClean="0"/>
-              <a:t>11/4/2017</a:t>
+              <a:t>11/16/2017</a:t>
             </a:fld>
             <a:endParaRPr lang="en-US" dirty="0"/>
           </a:p>
@@ -1613,7 +1613,7 @@
           <a:p>
             <a:fld id="{94B8254A-42AE-4BB1-B403-22A68DB22862}" type="datetime1">
               <a:rPr lang="en-US" smtClean="0"/>
-              <a:t>11/4/2017</a:t>
+              <a:t>11/16/2017</a:t>
             </a:fld>
             <a:endParaRPr lang="en-US" dirty="0"/>
           </a:p>
@@ -1931,7 +1931,7 @@
           <a:p>
             <a:fld id="{C99C7B92-9458-4761-8AF0-D64A121E3EAC}" type="datetime1">
               <a:rPr lang="en-US" smtClean="0"/>
-              <a:t>11/4/2017</a:t>
+              <a:t>11/16/2017</a:t>
             </a:fld>
             <a:endParaRPr lang="en-US" dirty="0"/>
           </a:p>
@@ -2350,7 +2350,7 @@
           <a:p>
             <a:fld id="{127006E2-60D5-4108-8588-BFDD8EC03D45}" type="datetime1">
               <a:rPr lang="en-US" smtClean="0"/>
-              <a:t>11/4/2017</a:t>
+              <a:t>11/16/2017</a:t>
             </a:fld>
             <a:endParaRPr lang="en-US" dirty="0"/>
           </a:p>
@@ -2463,7 +2463,7 @@
           <a:p>
             <a:fld id="{A60843F6-A3C4-4D30-A2FC-307087556594}" type="datetime1">
               <a:rPr lang="en-US" smtClean="0"/>
-              <a:t>11/4/2017</a:t>
+              <a:t>11/16/2017</a:t>
             </a:fld>
             <a:endParaRPr lang="en-US" dirty="0"/>
           </a:p>
@@ -2553,7 +2553,7 @@
           <a:p>
             <a:fld id="{382A89FB-209D-439B-A45E-3369DE63711E}" type="datetime1">
               <a:rPr lang="en-US" smtClean="0"/>
-              <a:t>11/4/2017</a:t>
+              <a:t>11/16/2017</a:t>
             </a:fld>
             <a:endParaRPr lang="en-US" dirty="0"/>
           </a:p>
@@ -2838,7 +2838,7 @@
           <a:p>
             <a:fld id="{45978698-0547-4F99-AA39-5C730CCAF472}" type="datetime1">
               <a:rPr lang="en-US" smtClean="0"/>
-              <a:t>11/4/2017</a:t>
+              <a:t>11/16/2017</a:t>
             </a:fld>
             <a:endParaRPr lang="en-US" dirty="0"/>
           </a:p>
@@ -3105,7 +3105,7 @@
           <a:p>
             <a:fld id="{CF888E07-4373-41AE-A048-01EAEC3D4EE0}" type="datetime1">
               <a:rPr lang="en-US" smtClean="0"/>
-              <a:t>11/4/2017</a:t>
+              <a:t>11/16/2017</a:t>
             </a:fld>
             <a:endParaRPr lang="en-US" dirty="0"/>
           </a:p>
@@ -3353,7 +3353,7 @@
           <a:p>
             <a:fld id="{35006A87-5A8C-49D3-8704-91472C5D37F9}" type="datetime1">
               <a:rPr lang="en-US" smtClean="0"/>
-              <a:t>11/4/2017</a:t>
+              <a:t>11/16/2017</a:t>
             </a:fld>
             <a:endParaRPr lang="en-US" dirty="0"/>
           </a:p>
@@ -9696,7 +9696,7 @@
           <a:p>
             <a:r>
               <a:rPr lang="ru-RU" smtClean="0"/>
-              <a:t>До какой-то степени работает, но не ловит случаи когда вовзращается </a:t>
+              <a:t>До какой-то степени работает, но не ловит случаи когда возвращается </a:t>
             </a:r>
             <a:r>
               <a:rPr lang="en-US" smtClean="0"/>
@@ -9710,23 +9710,15 @@
           <a:p>
             <a:r>
               <a:rPr lang="ru-RU" smtClean="0"/>
-              <a:t>Всё это слишком запутывается</a:t>
+              <a:t>Всё это слишком запутывается. Я называю такое </a:t>
+            </a:r>
+            <a:r>
+              <a:rPr lang="en-US" smtClean="0"/>
+              <a:t>SFINAE </a:t>
             </a:r>
             <a:r>
               <a:rPr lang="ru-RU" smtClean="0"/>
-              <a:t>. Я называю такое </a:t>
-            </a:r>
-            <a:r>
-              <a:rPr lang="en-US" smtClean="0"/>
-              <a:t>SFINAE </a:t>
-            </a:r>
-            <a:r>
-              <a:rPr lang="ru-RU" smtClean="0"/>
-              <a:t>"партизанским", потому что приходится блуждать в страшных лесах без еды годами с оружием. </a:t>
-            </a:r>
-            <a:r>
-              <a:rPr lang="ru-RU" smtClean="0"/>
-              <a:t>Поэтому люди искали более систематические подходы.</a:t>
+              <a:t>"партизанским", потому что приходится годами блуждать с оружием в страшных зимних лесах без еды и признаков жилья. Поэтому люди искали более систематические подходы.</a:t>
             </a:r>
             <a:endParaRPr lang="en-US"/>
           </a:p>
@@ -13869,13 +13861,7 @@
               <a:rPr lang="en-US" sz="2000">
                 <a:latin typeface="Consolas" panose="020B0609020204030204" pitchFamily="49" charset="0"/>
               </a:rPr>
-              <a:t>(sizeof(int) == </a:t>
-            </a:r>
-            <a:r>
-              <a:rPr lang="en-US" sz="2000">
-                <a:latin typeface="Consolas" panose="020B0609020204030204" pitchFamily="49" charset="0"/>
-              </a:rPr>
-              <a:t>4</a:t>
+              <a:t>(sizeof(int) == 4</a:t>
             </a:r>
             <a:r>
               <a:rPr lang="en-US" sz="2000" smtClean="0">
@@ -14016,13 +14002,7 @@
               <a:rPr lang="en-US" sz="1600">
                 <a:latin typeface="Consolas" panose="020B0609020204030204" pitchFamily="49" charset="0"/>
               </a:rPr>
-              <a:t>(sizeof(int) == </a:t>
-            </a:r>
-            <a:r>
-              <a:rPr lang="en-US" sz="1600">
-                <a:latin typeface="Consolas" panose="020B0609020204030204" pitchFamily="49" charset="0"/>
-              </a:rPr>
-              <a:t>4</a:t>
+              <a:t>(sizeof(int) == 4</a:t>
             </a:r>
             <a:r>
               <a:rPr lang="en-US" sz="1600" smtClean="0">
@@ -14062,13 +14042,7 @@
               <a:rPr lang="en-US" sz="1400">
                 <a:latin typeface="Consolas" panose="020B0609020204030204" pitchFamily="49" charset="0"/>
               </a:rPr>
-              <a:t>CT_ASSERT(pred) switch(0){case 0:case </a:t>
-            </a:r>
-            <a:r>
-              <a:rPr lang="en-US" sz="1400">
-                <a:latin typeface="Consolas" panose="020B0609020204030204" pitchFamily="49" charset="0"/>
-              </a:rPr>
-              <a:t>pred</a:t>
+              <a:t>CT_ASSERT(pred) switch(0){case 0:case pred</a:t>
             </a:r>
             <a:r>
               <a:rPr lang="en-US" sz="1400" smtClean="0">
@@ -14125,11 +14099,7 @@
             </a:r>
             <a:r>
               <a:rPr lang="en-US" sz="1600"/>
-              <a:t>via https</a:t>
-            </a:r>
-            <a:r>
-              <a:rPr lang="en-US" sz="1600"/>
-              <a:t>://</a:t>
+              <a:t>via https://</a:t>
             </a:r>
             <a:r>
               <a:rPr lang="en-US" sz="1600" smtClean="0"/>
@@ -14145,6 +14115,35 @@
               <a:rPr lang="en-US" sz="1600">
                 <a:latin typeface="Consolas" panose="020B0609020204030204" pitchFamily="49" charset="0"/>
               </a:rPr>
+              <a:t>#define </a:t>
+            </a:r>
+            <a:r>
+              <a:rPr lang="en-US" sz="1600" smtClean="0">
+                <a:latin typeface="Consolas" panose="020B0609020204030204" pitchFamily="49" charset="0"/>
+              </a:rPr>
+              <a:t>CT_ASSERT(predicate) impl_CASSERT_LINE(predicate</a:t>
+            </a:r>
+            <a:r>
+              <a:rPr lang="en-US" sz="1600">
+                <a:latin typeface="Consolas" panose="020B0609020204030204" pitchFamily="49" charset="0"/>
+              </a:rPr>
+              <a:t>,__LINE</a:t>
+            </a:r>
+            <a:r>
+              <a:rPr lang="en-US" sz="1600" smtClean="0">
+                <a:latin typeface="Consolas" panose="020B0609020204030204" pitchFamily="49" charset="0"/>
+              </a:rPr>
+              <a:t>__,__COUNTER__)</a:t>
+            </a:r>
+          </a:p>
+          <a:p>
+            <a:pPr marL="45720" indent="0">
+              <a:buNone/>
+            </a:pPr>
+            <a:r>
+              <a:rPr lang="en-US" sz="1600" smtClean="0">
+                <a:latin typeface="Consolas" panose="020B0609020204030204" pitchFamily="49" charset="0"/>
+              </a:rPr>
               <a:t>#</a:t>
             </a:r>
             <a:r>
@@ -14157,60 +14156,13 @@
               <a:rPr lang="en-US" sz="1600" smtClean="0">
                 <a:latin typeface="Consolas" panose="020B0609020204030204" pitchFamily="49" charset="0"/>
               </a:rPr>
-              <a:t>CT_ASSERT(predicate) impl_CASSERT_LINE(predicate</a:t>
+              <a:t>impl_PASTE(a,b</a:t>
             </a:r>
             <a:r>
               <a:rPr lang="en-US" sz="1600">
                 <a:latin typeface="Consolas" panose="020B0609020204030204" pitchFamily="49" charset="0"/>
               </a:rPr>
-              <a:t>,__</a:t>
-            </a:r>
-            <a:r>
-              <a:rPr lang="en-US" sz="1600">
-                <a:latin typeface="Consolas" panose="020B0609020204030204" pitchFamily="49" charset="0"/>
-              </a:rPr>
-              <a:t>LINE</a:t>
-            </a:r>
-            <a:r>
-              <a:rPr lang="en-US" sz="1600" smtClean="0">
-                <a:latin typeface="Consolas" panose="020B0609020204030204" pitchFamily="49" charset="0"/>
-              </a:rPr>
-              <a:t>__,__COUNTER__)</a:t>
-            </a:r>
-          </a:p>
-          <a:p>
-            <a:pPr marL="45720" indent="0">
-              <a:buNone/>
-            </a:pPr>
-            <a:r>
-              <a:rPr lang="en-US" sz="1600" smtClean="0">
-                <a:latin typeface="Consolas" panose="020B0609020204030204" pitchFamily="49" charset="0"/>
-              </a:rPr>
-              <a:t>#</a:t>
-            </a:r>
-            <a:r>
-              <a:rPr lang="en-US" sz="1600">
-                <a:latin typeface="Consolas" panose="020B0609020204030204" pitchFamily="49" charset="0"/>
-              </a:rPr>
-              <a:t>define </a:t>
-            </a:r>
-            <a:r>
-              <a:rPr lang="en-US" sz="1600" smtClean="0">
-                <a:latin typeface="Consolas" panose="020B0609020204030204" pitchFamily="49" charset="0"/>
-              </a:rPr>
-              <a:t>impl_PASTE(a,b</a:t>
-            </a:r>
-            <a:r>
-              <a:rPr lang="en-US" sz="1600">
-                <a:latin typeface="Consolas" panose="020B0609020204030204" pitchFamily="49" charset="0"/>
-              </a:rPr>
-              <a:t>) a</a:t>
-            </a:r>
-            <a:r>
-              <a:rPr lang="en-US" sz="1600">
-                <a:latin typeface="Consolas" panose="020B0609020204030204" pitchFamily="49" charset="0"/>
-              </a:rPr>
-              <a:t>##</a:t>
+              <a:t>) a##</a:t>
             </a:r>
             <a:r>
               <a:rPr lang="en-US" sz="1600" smtClean="0">
@@ -14233,13 +14185,7 @@
               <a:rPr lang="en-US" sz="1600">
                 <a:latin typeface="Consolas" panose="020B0609020204030204" pitchFamily="49" charset="0"/>
               </a:rPr>
-              <a:t>, line</a:t>
-            </a:r>
-            <a:r>
-              <a:rPr lang="en-US" sz="1600">
-                <a:latin typeface="Consolas" panose="020B0609020204030204" pitchFamily="49" charset="0"/>
-              </a:rPr>
-              <a:t>, </a:t>
+              <a:t>, line, </a:t>
             </a:r>
             <a:r>
               <a:rPr lang="en-US" sz="1600" smtClean="0">
@@ -14262,13 +14208,7 @@
               <a:rPr lang="en-US" sz="1600">
                 <a:latin typeface="Consolas" panose="020B0609020204030204" pitchFamily="49" charset="0"/>
               </a:rPr>
-              <a:t>typedef </a:t>
-            </a:r>
-            <a:r>
-              <a:rPr lang="en-US" sz="1600">
-                <a:latin typeface="Consolas" panose="020B0609020204030204" pitchFamily="49" charset="0"/>
-              </a:rPr>
-              <a:t>char </a:t>
+              <a:t>typedef char </a:t>
             </a:r>
             <a:r>
               <a:rPr lang="en-US" sz="1600" smtClean="0">
@@ -14411,13 +14351,7 @@
               <a:rPr lang="en-US" sz="1600">
                 <a:latin typeface="Consolas" panose="020B0609020204030204" pitchFamily="49" charset="0"/>
               </a:rPr>
-              <a:t>CT_ASSERT (sizeof(int) == </a:t>
-            </a:r>
-            <a:r>
-              <a:rPr lang="en-US" sz="1600">
-                <a:latin typeface="Consolas" panose="020B0609020204030204" pitchFamily="49" charset="0"/>
-              </a:rPr>
-              <a:t>4</a:t>
+              <a:t>CT_ASSERT (sizeof(int) == 4</a:t>
             </a:r>
             <a:r>
               <a:rPr lang="en-US" sz="1600" smtClean="0">
@@ -14449,13 +14383,7 @@
               <a:rPr lang="en-US" sz="1600">
                 <a:latin typeface="Consolas" panose="020B0609020204030204" pitchFamily="49" charset="0"/>
               </a:rPr>
-              <a:t>template &lt;bool cond&gt; </a:t>
-            </a:r>
-            <a:r>
-              <a:rPr lang="en-US" sz="1600">
-                <a:latin typeface="Consolas" panose="020B0609020204030204" pitchFamily="49" charset="0"/>
-              </a:rPr>
-              <a:t>struct </a:t>
+              <a:t>template &lt;bool cond&gt; struct </a:t>
             </a:r>
             <a:r>
               <a:rPr lang="en-US" sz="1600" smtClean="0">
@@ -14501,13 +14429,7 @@
               <a:rPr lang="en-US" sz="1600">
                 <a:latin typeface="Consolas" panose="020B0609020204030204" pitchFamily="49" charset="0"/>
               </a:rPr>
-              <a:t>) </a:t>
-            </a:r>
-            <a:r>
-              <a:rPr lang="en-US" sz="1600">
-                <a:latin typeface="Consolas" panose="020B0609020204030204" pitchFamily="49" charset="0"/>
-              </a:rPr>
-              <a:t>== </a:t>
+              <a:t>) == </a:t>
             </a:r>
             <a:r>
               <a:rPr lang="en-US" sz="1600" smtClean="0">
@@ -14577,13 +14499,7 @@
               <a:rPr lang="en-US" sz="1600">
                 <a:latin typeface="Consolas" panose="020B0609020204030204" pitchFamily="49" charset="0"/>
               </a:rPr>
-              <a:t>sizeof(int) == </a:t>
-            </a:r>
-            <a:r>
-              <a:rPr lang="en-US" sz="1600">
-                <a:latin typeface="Consolas" panose="020B0609020204030204" pitchFamily="49" charset="0"/>
-              </a:rPr>
-              <a:t>4</a:t>
+              <a:t>sizeof(int) == 4</a:t>
             </a:r>
             <a:r>
               <a:rPr lang="ru-RU" sz="1600" smtClean="0">
@@ -14762,42 +14678,30 @@
               <a:rPr lang="en-US" sz="1800">
                 <a:latin typeface="Consolas" panose="020B0609020204030204" pitchFamily="49" charset="0"/>
               </a:rPr>
-              <a:t>X</a:t>
+              <a:t>X##</a:t>
+            </a:r>
+            <a:r>
+              <a:rPr lang="en-US" sz="1800" smtClean="0">
+                <a:latin typeface="Consolas" panose="020B0609020204030204" pitchFamily="49" charset="0"/>
+              </a:rPr>
+              <a:t>Y</a:t>
+            </a:r>
+          </a:p>
+          <a:p>
+            <a:pPr marL="45720" indent="0">
+              <a:buNone/>
+            </a:pPr>
+            <a:r>
+              <a:rPr lang="en-US" sz="1800" smtClean="0">
+                <a:latin typeface="Consolas" panose="020B0609020204030204" pitchFamily="49" charset="0"/>
+              </a:rPr>
+              <a:t>template </a:t>
             </a:r>
             <a:r>
               <a:rPr lang="en-US" sz="1800">
                 <a:latin typeface="Consolas" panose="020B0609020204030204" pitchFamily="49" charset="0"/>
               </a:rPr>
-              <a:t>##</a:t>
-            </a:r>
-            <a:r>
-              <a:rPr lang="en-US" sz="1800" smtClean="0">
-                <a:latin typeface="Consolas" panose="020B0609020204030204" pitchFamily="49" charset="0"/>
-              </a:rPr>
-              <a:t>Y</a:t>
-            </a:r>
-          </a:p>
-          <a:p>
-            <a:pPr marL="45720" indent="0">
-              <a:buNone/>
-            </a:pPr>
-            <a:r>
-              <a:rPr lang="en-US" sz="1800" smtClean="0">
-                <a:latin typeface="Consolas" panose="020B0609020204030204" pitchFamily="49" charset="0"/>
-              </a:rPr>
-              <a:t>template </a:t>
-            </a:r>
-            <a:r>
-              <a:rPr lang="en-US" sz="1800">
-                <a:latin typeface="Consolas" panose="020B0609020204030204" pitchFamily="49" charset="0"/>
-              </a:rPr>
-              <a:t>&lt;bool x&gt; </a:t>
-            </a:r>
-            <a:r>
-              <a:rPr lang="en-US" sz="1800">
-                <a:latin typeface="Consolas" panose="020B0609020204030204" pitchFamily="49" charset="0"/>
-              </a:rPr>
-              <a:t>struct </a:t>
+              <a:t>&lt;bool x&gt; struct </a:t>
             </a:r>
             <a:r>
               <a:rPr lang="en-US" sz="1800" smtClean="0">
@@ -14820,13 +14724,7 @@
               <a:rPr lang="en-US" sz="1800">
                 <a:latin typeface="Consolas" panose="020B0609020204030204" pitchFamily="49" charset="0"/>
               </a:rPr>
-              <a:t>&lt;&gt; struct STATIC_ASSERTION_FAILURE&lt;true&gt; { enum { value = 1 </a:t>
-            </a:r>
-            <a:r>
-              <a:rPr lang="en-US" sz="1800">
-                <a:latin typeface="Consolas" panose="020B0609020204030204" pitchFamily="49" charset="0"/>
-              </a:rPr>
-              <a:t>}; </a:t>
+              <a:t>&lt;&gt; struct STATIC_ASSERTION_FAILURE&lt;true&gt; { enum { value = 1 }; </a:t>
             </a:r>
             <a:r>
               <a:rPr lang="en-US" sz="1800" smtClean="0">
@@ -14846,13 +14744,7 @@
               <a:rPr lang="en-US" sz="1800">
                 <a:latin typeface="Consolas" panose="020B0609020204030204" pitchFamily="49" charset="0"/>
               </a:rPr>
-              <a:t>#</a:t>
-            </a:r>
-            <a:r>
-              <a:rPr lang="en-US" sz="1800">
-                <a:latin typeface="Consolas" panose="020B0609020204030204" pitchFamily="49" charset="0"/>
-              </a:rPr>
-              <a:t>define </a:t>
+              <a:t>#define </a:t>
             </a:r>
             <a:r>
               <a:rPr lang="en-US" sz="1800" smtClean="0">
@@ -14875,13 +14767,7 @@
               <a:rPr lang="en-US" sz="1800">
                 <a:latin typeface="Consolas" panose="020B0609020204030204" pitchFamily="49" charset="0"/>
               </a:rPr>
-              <a:t>typedef ::boost::</a:t>
-            </a:r>
-            <a:r>
-              <a:rPr lang="en-US" sz="1800">
-                <a:latin typeface="Consolas" panose="020B0609020204030204" pitchFamily="49" charset="0"/>
-              </a:rPr>
-              <a:t>static_assert_test</a:t>
+              <a:t>typedef ::boost::static_assert_test</a:t>
             </a:r>
             <a:r>
               <a:rPr lang="en-US" sz="1800" smtClean="0">
@@ -14904,13 +14790,7 @@
               <a:rPr lang="en-US" sz="1800">
                 <a:latin typeface="Consolas" panose="020B0609020204030204" pitchFamily="49" charset="0"/>
               </a:rPr>
-              <a:t>sizeof(::boost</a:t>
-            </a:r>
-            <a:r>
-              <a:rPr lang="en-US" sz="1800">
-                <a:latin typeface="Consolas" panose="020B0609020204030204" pitchFamily="49" charset="0"/>
-              </a:rPr>
-              <a:t>::</a:t>
+              <a:t>sizeof(::boost::</a:t>
             </a:r>
             <a:r>
               <a:rPr lang="en-US" sz="1800" smtClean="0">
@@ -14933,13 +14813,7 @@
               <a:rPr lang="en-US" sz="1800">
                 <a:latin typeface="Consolas" panose="020B0609020204030204" pitchFamily="49" charset="0"/>
               </a:rPr>
-              <a:t>BOOST_JOIN(boost_static_assert_typedef</a:t>
-            </a:r>
-            <a:r>
-              <a:rPr lang="en-US" sz="1800">
-                <a:latin typeface="Consolas" panose="020B0609020204030204" pitchFamily="49" charset="0"/>
-              </a:rPr>
-              <a:t>_, </a:t>
+              <a:t>BOOST_JOIN(boost_static_assert_typedef_, </a:t>
             </a:r>
             <a:r>
               <a:rPr lang="en-US" sz="1800" smtClean="0">
@@ -20367,13 +20241,19 @@
                 </a:solidFill>
                 <a:latin typeface="Consolas" panose="020B0609020204030204" pitchFamily="49" charset="0"/>
               </a:rPr>
-              <a:t>&gt;</a:t>
+              <a:t>&gt;{}</a:t>
             </a:r>
             <a:r>
               <a:rPr lang="en-US" sz="1400" smtClean="0">
                 <a:latin typeface="Consolas" panose="020B0609020204030204" pitchFamily="49" charset="0"/>
               </a:rPr>
-              <a:t>&gt; {};</a:t>
+              <a:t>&gt; </a:t>
+            </a:r>
+            <a:r>
+              <a:rPr lang="en-US" sz="1400" smtClean="0">
+                <a:latin typeface="Consolas" panose="020B0609020204030204" pitchFamily="49" charset="0"/>
+              </a:rPr>
+              <a:t>{};</a:t>
             </a:r>
             <a:endParaRPr lang="en-US" sz="1400">
               <a:latin typeface="Consolas" panose="020B0609020204030204" pitchFamily="49" charset="0"/>
@@ -20554,7 +20434,7 @@
               <a:rPr lang="en-US" sz="1400" smtClean="0">
                 <a:latin typeface="Consolas" panose="020B0609020204030204" pitchFamily="49" charset="0"/>
               </a:rPr>
-              <a:t>&gt;&gt; {}</a:t>
+              <a:t>&gt;{}&gt; {};</a:t>
             </a:r>
             <a:endParaRPr lang="ru-RU" sz="1400" smtClean="0">
               <a:latin typeface="Consolas" panose="020B0609020204030204" pitchFamily="49" charset="0"/>

</xml_diff>

<commit_message>
More slides and more code for constexpr lecture
git-svn-id: https://svn.code.sf.net/p/cpp-lects-rus/code/trunk@241 39143b06-f351-456c-9f92-4cd32fad6823
</commit_message>
<xml_diff>
--- a/slides/sep2017/08-sfinae.pptx
+++ b/slides/sep2017/08-sfinae.pptx
@@ -19114,7 +19114,15 @@
             </a:r>
             <a:r>
               <a:rPr lang="en-US" smtClean="0"/>
-              <a:t>(sz &lt; 4)?</a:t>
+              <a:t>(sz </a:t>
+            </a:r>
+            <a:r>
+              <a:rPr lang="en-US" smtClean="0"/>
+              <a:t>&lt;= </a:t>
+            </a:r>
+            <a:r>
+              <a:rPr lang="en-US" smtClean="0"/>
+              <a:t>4)?</a:t>
             </a:r>
             <a:endParaRPr lang="en-US"/>
           </a:p>
@@ -20518,8 +20526,8 @@
         </p:nvSpPr>
         <p:spPr>
           <a:xfrm>
-            <a:off x="1143000" y="2057400"/>
-            <a:ext cx="10524744" cy="4038600"/>
+            <a:off x="1142999" y="2057400"/>
+            <a:ext cx="10646229" cy="4038600"/>
           </a:xfrm>
         </p:spPr>
         <p:txBody>
@@ -20651,7 +20659,19 @@
               <a:rPr lang="en-US">
                 <a:latin typeface="Consolas" panose="020B0609020204030204" pitchFamily="49" charset="0"/>
               </a:rPr>
-              <a:t>enable_if_t&lt;(sizeof(T) &gt; 4), T&gt;</a:t>
+              <a:t>enable_if_t&lt;(sizeof(T) </a:t>
+            </a:r>
+            <a:r>
+              <a:rPr lang="en-US" smtClean="0">
+                <a:latin typeface="Consolas" panose="020B0609020204030204" pitchFamily="49" charset="0"/>
+              </a:rPr>
+              <a:t>&lt;= </a:t>
+            </a:r>
+            <a:r>
+              <a:rPr lang="en-US">
+                <a:latin typeface="Consolas" panose="020B0609020204030204" pitchFamily="49" charset="0"/>
+              </a:rPr>
+              <a:t>4), T&gt;</a:t>
             </a:r>
             <a:r>
               <a:rPr lang="en-US" smtClean="0">
@@ -20803,7 +20823,7 @@
         <p:spPr>
           <a:xfrm>
             <a:off x="1143000" y="2057400"/>
-            <a:ext cx="10524744" cy="4038600"/>
+            <a:ext cx="10695214" cy="4038600"/>
           </a:xfrm>
         </p:spPr>
         <p:txBody>
@@ -20935,7 +20955,25 @@
               <a:rPr lang="en-US">
                 <a:latin typeface="Consolas" panose="020B0609020204030204" pitchFamily="49" charset="0"/>
               </a:rPr>
-              <a:t>enable_if_t&lt;(sizeof(T) &gt; 4), T&gt;</a:t>
+              <a:t>enable_if_t&lt;(sizeof(T) </a:t>
+            </a:r>
+            <a:r>
+              <a:rPr lang="en-US" smtClean="0">
+                <a:latin typeface="Consolas" panose="020B0609020204030204" pitchFamily="49" charset="0"/>
+              </a:rPr>
+              <a:t>&lt;=</a:t>
+            </a:r>
+            <a:r>
+              <a:rPr lang="en-US" smtClean="0">
+                <a:latin typeface="Consolas" panose="020B0609020204030204" pitchFamily="49" charset="0"/>
+              </a:rPr>
+              <a:t> </a:t>
+            </a:r>
+            <a:r>
+              <a:rPr lang="en-US">
+                <a:latin typeface="Consolas" panose="020B0609020204030204" pitchFamily="49" charset="0"/>
+              </a:rPr>
+              <a:t>4), T&gt;</a:t>
             </a:r>
             <a:r>
               <a:rPr lang="en-US" smtClean="0">
@@ -25314,15 +25352,7 @@
             <a:pPr lvl="0"/>
             <a:r>
               <a:rPr lang="en-US" smtClean="0"/>
-              <a:t>Louis Dionne, </a:t>
-            </a:r>
-            <a:r>
-              <a:rPr lang="en-US" smtClean="0"/>
-              <a:t>"C</a:t>
-            </a:r>
-            <a:r>
-              <a:rPr lang="en-US" smtClean="0"/>
-              <a:t>++ Metaprogramming -- A Paradigm Shift", </a:t>
+              <a:t>Louis Dionne, "C++ Metaprogramming -- A Paradigm Shift", </a:t>
             </a:r>
             <a:r>
               <a:rPr lang="en-US"/>
@@ -25340,27 +25370,15 @@
             <a:pPr lvl="0"/>
             <a:r>
               <a:rPr lang="en-US"/>
-              <a:t>Arthur </a:t>
+              <a:t>Arthur O'Dwyer </a:t>
+            </a:r>
+            <a:r>
+              <a:rPr lang="en-US" smtClean="0"/>
+              <a:t>"A </a:t>
             </a:r>
             <a:r>
               <a:rPr lang="en-US"/>
-              <a:t>O'Dwyer </a:t>
-            </a:r>
-            <a:r>
-              <a:rPr lang="en-US" smtClean="0"/>
-              <a:t>"A </a:t>
-            </a:r>
-            <a:r>
-              <a:rPr lang="en-US"/>
-              <a:t>Soupçon </a:t>
-            </a:r>
-            <a:r>
-              <a:rPr lang="en-US"/>
-              <a:t>of </a:t>
-            </a:r>
-            <a:r>
-              <a:rPr lang="en-US"/>
-              <a:t>SFINAE", CppCon'2017, https://www.youtube.com/watch?v=ybaE9qlhHvw</a:t>
+              <a:t>Soupçon of SFINAE", CppCon'2017, https://www.youtube.com/watch?v=ybaE9qlhHvw</a:t>
             </a:r>
             <a:endParaRPr lang="en-US" dirty="0"/>
           </a:p>

</xml_diff>